<commit_message>
Add presentation to build (#33)
* add tally_api_key env variable

* First iteration. Can generate pptx.

* Add powerpoint template capability

* Finish documentation
</commit_message>
<xml_diff>
--- a/tests/fixtures/Datasmoothie_Template.pptx
+++ b/tests/fixtures/Datasmoothie_Template.pptx
@@ -121,7 +121,7 @@
 </file>
 
 <file path=ppt/slideLayouts/slideLayout1.xml><?xml version="1.0" encoding="utf-8"?>
-<p:sldLayout xmlns:a="http://schemas.openxmlformats.org/drawingml/2006/main" xmlns:r="http://schemas.openxmlformats.org/officeDocument/2006/relationships" xmlns:p="http://schemas.openxmlformats.org/presentationml/2006/main" type="blank" preserve="1">
+<p:sldLayout xmlns:a="http://schemas.openxmlformats.org/drawingml/2006/main" xmlns:r="http://schemas.openxmlformats.org/officeDocument/2006/relationships" xmlns:p="http://schemas.openxmlformats.org/presentationml/2006/main" preserve="1" userDrawn="1">
   <p:cSld name="Blank">
     <p:spTree>
       <p:nvGrpSpPr>
@@ -139,7 +139,7 @@
       </p:grpSpPr>
       <p:sp>
         <p:nvSpPr>
-          <p:cNvPr id="2" name="Date Placeholder 1"/>
+          <p:cNvPr id="2" name="Date Placeholder"/>
           <p:cNvSpPr>
             <a:spLocks noGrp="1"/>
           </p:cNvSpPr>
@@ -154,7 +154,7 @@
           <a:p>
             <a:fld id="{4D94136C-8742-45B2-AF27-D93DF72833A9}" type="datetimeFigureOut">
               <a:rPr lang="en-US" smtClean="0"/>
-              <a:t>5/13/21</a:t>
+              <a:t>5/18/23</a:t>
             </a:fld>
             <a:endParaRPr lang="en-US" dirty="0"/>
           </a:p>
@@ -162,7 +162,7 @@
       </p:sp>
       <p:sp>
         <p:nvSpPr>
-          <p:cNvPr id="3" name="Footer Placeholder 2"/>
+          <p:cNvPr id="3" name="Footer Placeholder"/>
           <p:cNvSpPr>
             <a:spLocks noGrp="1"/>
           </p:cNvSpPr>
@@ -181,7 +181,7 @@
       </p:sp>
       <p:sp>
         <p:nvSpPr>
-          <p:cNvPr id="4" name="Slide Number Placeholder 3"/>
+          <p:cNvPr id="4" name="Slide Number Placeholder"/>
           <p:cNvSpPr>
             <a:spLocks noGrp="1"/>
           </p:cNvSpPr>
@@ -203,10 +203,372 @@
           </a:p>
         </p:txBody>
       </p:sp>
+      <p:sp>
+        <p:nvSpPr>
+          <p:cNvPr id="6" name="Chart placeholder">
+            <a:extLst>
+              <a:ext uri="{FF2B5EF4-FFF2-40B4-BE49-F238E27FC236}">
+                <a16:creationId xmlns:a16="http://schemas.microsoft.com/office/drawing/2014/main" id="{0A725B97-D916-8232-228D-0322FA5CEA29}"/>
+              </a:ext>
+            </a:extLst>
+          </p:cNvPr>
+          <p:cNvSpPr>
+            <a:spLocks noGrp="1"/>
+          </p:cNvSpPr>
+          <p:nvPr>
+            <p:ph type="chart" sz="quarter" idx="13"/>
+          </p:nvPr>
+        </p:nvSpPr>
+        <p:spPr>
+          <a:xfrm>
+            <a:off x="838201" y="1432560"/>
+            <a:ext cx="10515600" cy="4277360"/>
+          </a:xfrm>
+        </p:spPr>
+        <p:txBody>
+          <a:bodyPr/>
+          <a:lstStyle/>
+          <a:p>
+            <a:endParaRPr lang="en-GB"/>
+          </a:p>
+        </p:txBody>
+      </p:sp>
+      <p:sp>
+        <p:nvSpPr>
+          <p:cNvPr id="8" name="Base placeholder">
+            <a:extLst>
+              <a:ext uri="{FF2B5EF4-FFF2-40B4-BE49-F238E27FC236}">
+                <a16:creationId xmlns:a16="http://schemas.microsoft.com/office/drawing/2014/main" id="{7805082B-9B37-0AFA-EA7B-46B215C37238}"/>
+              </a:ext>
+            </a:extLst>
+          </p:cNvPr>
+          <p:cNvSpPr>
+            <a:spLocks noGrp="1"/>
+          </p:cNvSpPr>
+          <p:nvPr>
+            <p:ph type="body" sz="quarter" idx="14" hasCustomPrompt="1"/>
+          </p:nvPr>
+        </p:nvSpPr>
+        <p:spPr>
+          <a:xfrm>
+            <a:off x="838199" y="5875655"/>
+            <a:ext cx="10515600" cy="386080"/>
+          </a:xfrm>
+        </p:spPr>
+        <p:txBody>
+          <a:bodyPr>
+            <a:normAutofit/>
+          </a:bodyPr>
+          <a:lstStyle>
+            <a:lvl1pPr marL="0" indent="0">
+              <a:buNone/>
+              <a:defRPr sz="1400"/>
+            </a:lvl1pPr>
+          </a:lstStyle>
+          <a:p>
+            <a:pPr lvl="0"/>
+            <a:r>
+              <a:rPr lang="en-GB" dirty="0"/>
+              <a:t>Base placeholder</a:t>
+            </a:r>
+          </a:p>
+        </p:txBody>
+      </p:sp>
+      <p:sp>
+        <p:nvSpPr>
+          <p:cNvPr id="7" name="Title placeholder">
+            <a:extLst>
+              <a:ext uri="{FF2B5EF4-FFF2-40B4-BE49-F238E27FC236}">
+                <a16:creationId xmlns:a16="http://schemas.microsoft.com/office/drawing/2014/main" id="{EE07529E-0DD6-44AD-D79D-91F209B65671}"/>
+              </a:ext>
+            </a:extLst>
+          </p:cNvPr>
+          <p:cNvSpPr>
+            <a:spLocks noGrp="1"/>
+          </p:cNvSpPr>
+          <p:nvPr>
+            <p:ph type="body" sz="quarter" idx="16"/>
+          </p:nvPr>
+        </p:nvSpPr>
+        <p:spPr>
+          <a:xfrm>
+            <a:off x="838199" y="887730"/>
+            <a:ext cx="10515600" cy="386080"/>
+          </a:xfrm>
+        </p:spPr>
+        <p:txBody>
+          <a:bodyPr>
+            <a:normAutofit/>
+          </a:bodyPr>
+          <a:lstStyle>
+            <a:lvl1pPr marL="0" indent="0">
+              <a:buNone/>
+              <a:defRPr sz="1800"/>
+            </a:lvl1pPr>
+          </a:lstStyle>
+          <a:p>
+            <a:pPr lvl="0"/>
+            <a:r>
+              <a:rPr lang="en-GB" dirty="0"/>
+              <a:t>Click to edit Master text styles</a:t>
+            </a:r>
+          </a:p>
+        </p:txBody>
+      </p:sp>
     </p:spTree>
     <p:extLst>
       <p:ext uri="{BB962C8B-B14F-4D97-AF65-F5344CB8AC3E}">
         <p14:creationId xmlns:p14="http://schemas.microsoft.com/office/powerpoint/2010/main" val="1620429635"/>
+      </p:ext>
+    </p:extLst>
+  </p:cSld>
+  <p:clrMapOvr>
+    <a:masterClrMapping/>
+  </p:clrMapOvr>
+  <p:extLst>
+    <p:ext uri="{DCECCB84-F9BA-43D5-87BE-67443E8EF086}">
+      <p15:sldGuideLst xmlns:p15="http://schemas.microsoft.com/office/powerpoint/2012/main"/>
+    </p:ext>
+  </p:extLst>
+</p:sldLayout>
+</file>
+
+<file path=ppt/slideLayouts/slideLayout2.xml><?xml version="1.0" encoding="utf-8"?>
+<p:sldLayout xmlns:a="http://schemas.openxmlformats.org/drawingml/2006/main" xmlns:r="http://schemas.openxmlformats.org/officeDocument/2006/relationships" xmlns:p="http://schemas.openxmlformats.org/presentationml/2006/main" preserve="1" userDrawn="1">
+  <p:cSld name="1_Blank">
+    <p:spTree>
+      <p:nvGrpSpPr>
+        <p:cNvPr id="1" name=""/>
+        <p:cNvGrpSpPr/>
+        <p:nvPr/>
+      </p:nvGrpSpPr>
+      <p:grpSpPr>
+        <a:xfrm>
+          <a:off x="0" y="0"/>
+          <a:ext cx="0" cy="0"/>
+          <a:chOff x="0" y="0"/>
+          <a:chExt cx="0" cy="0"/>
+        </a:xfrm>
+      </p:grpSpPr>
+      <p:sp>
+        <p:nvSpPr>
+          <p:cNvPr id="2" name="Date Placeholder"/>
+          <p:cNvSpPr>
+            <a:spLocks noGrp="1"/>
+          </p:cNvSpPr>
+          <p:nvPr>
+            <p:ph type="dt" sz="half" idx="10"/>
+          </p:nvPr>
+        </p:nvSpPr>
+        <p:spPr/>
+        <p:txBody>
+          <a:bodyPr/>
+          <a:lstStyle/>
+          <a:p>
+            <a:fld id="{4D94136C-8742-45B2-AF27-D93DF72833A9}" type="datetimeFigureOut">
+              <a:rPr lang="en-US" smtClean="0"/>
+              <a:t>5/18/23</a:t>
+            </a:fld>
+            <a:endParaRPr lang="en-US" dirty="0"/>
+          </a:p>
+        </p:txBody>
+      </p:sp>
+      <p:sp>
+        <p:nvSpPr>
+          <p:cNvPr id="3" name="Footer Placeholder"/>
+          <p:cNvSpPr>
+            <a:spLocks noGrp="1"/>
+          </p:cNvSpPr>
+          <p:nvPr>
+            <p:ph type="ftr" sz="quarter" idx="11"/>
+          </p:nvPr>
+        </p:nvSpPr>
+        <p:spPr/>
+        <p:txBody>
+          <a:bodyPr/>
+          <a:lstStyle/>
+          <a:p>
+            <a:endParaRPr lang="en-US" dirty="0"/>
+          </a:p>
+        </p:txBody>
+      </p:sp>
+      <p:sp>
+        <p:nvSpPr>
+          <p:cNvPr id="4" name="Slide Number Placeholder"/>
+          <p:cNvSpPr>
+            <a:spLocks noGrp="1"/>
+          </p:cNvSpPr>
+          <p:nvPr>
+            <p:ph type="sldNum" sz="quarter" idx="12"/>
+          </p:nvPr>
+        </p:nvSpPr>
+        <p:spPr/>
+        <p:txBody>
+          <a:bodyPr/>
+          <a:lstStyle/>
+          <a:p>
+            <a:fld id="{4FAB73BC-B049-4115-A692-8D63A059BFB8}" type="slidenum">
+              <a:rPr lang="en-US" smtClean="0"/>
+              <a:pPr/>
+              <a:t>‹#›</a:t>
+            </a:fld>
+            <a:endParaRPr lang="en-US" dirty="0"/>
+          </a:p>
+        </p:txBody>
+      </p:sp>
+      <p:sp>
+        <p:nvSpPr>
+          <p:cNvPr id="6" name="Chart placeholder">
+            <a:extLst>
+              <a:ext uri="{FF2B5EF4-FFF2-40B4-BE49-F238E27FC236}">
+                <a16:creationId xmlns:a16="http://schemas.microsoft.com/office/drawing/2014/main" id="{0A725B97-D916-8232-228D-0322FA5CEA29}"/>
+              </a:ext>
+            </a:extLst>
+          </p:cNvPr>
+          <p:cNvSpPr>
+            <a:spLocks noGrp="1"/>
+          </p:cNvSpPr>
+          <p:nvPr>
+            <p:ph type="chart" sz="quarter" idx="13"/>
+          </p:nvPr>
+        </p:nvSpPr>
+        <p:spPr>
+          <a:xfrm>
+            <a:off x="838202" y="1432560"/>
+            <a:ext cx="5116628" cy="4277360"/>
+          </a:xfrm>
+        </p:spPr>
+        <p:txBody>
+          <a:bodyPr/>
+          <a:lstStyle/>
+          <a:p>
+            <a:endParaRPr lang="en-GB"/>
+          </a:p>
+        </p:txBody>
+      </p:sp>
+      <p:sp>
+        <p:nvSpPr>
+          <p:cNvPr id="8" name="Base placeholder">
+            <a:extLst>
+              <a:ext uri="{FF2B5EF4-FFF2-40B4-BE49-F238E27FC236}">
+                <a16:creationId xmlns:a16="http://schemas.microsoft.com/office/drawing/2014/main" id="{7805082B-9B37-0AFA-EA7B-46B215C37238}"/>
+              </a:ext>
+            </a:extLst>
+          </p:cNvPr>
+          <p:cNvSpPr>
+            <a:spLocks noGrp="1"/>
+          </p:cNvSpPr>
+          <p:nvPr>
+            <p:ph type="body" sz="quarter" idx="14" hasCustomPrompt="1"/>
+          </p:nvPr>
+        </p:nvSpPr>
+        <p:spPr>
+          <a:xfrm>
+            <a:off x="838199" y="5875655"/>
+            <a:ext cx="10515600" cy="386080"/>
+          </a:xfrm>
+        </p:spPr>
+        <p:txBody>
+          <a:bodyPr>
+            <a:normAutofit/>
+          </a:bodyPr>
+          <a:lstStyle>
+            <a:lvl1pPr marL="0" indent="0">
+              <a:buNone/>
+              <a:defRPr sz="1400"/>
+            </a:lvl1pPr>
+          </a:lstStyle>
+          <a:p>
+            <a:pPr lvl="0"/>
+            <a:r>
+              <a:rPr lang="en-GB" dirty="0"/>
+              <a:t>Base placeholder</a:t>
+            </a:r>
+          </a:p>
+        </p:txBody>
+      </p:sp>
+      <p:sp>
+        <p:nvSpPr>
+          <p:cNvPr id="7" name="Title placeholder">
+            <a:extLst>
+              <a:ext uri="{FF2B5EF4-FFF2-40B4-BE49-F238E27FC236}">
+                <a16:creationId xmlns:a16="http://schemas.microsoft.com/office/drawing/2014/main" id="{EE07529E-0DD6-44AD-D79D-91F209B65671}"/>
+              </a:ext>
+            </a:extLst>
+          </p:cNvPr>
+          <p:cNvSpPr>
+            <a:spLocks noGrp="1"/>
+          </p:cNvSpPr>
+          <p:nvPr>
+            <p:ph type="body" sz="quarter" idx="16"/>
+          </p:nvPr>
+        </p:nvSpPr>
+        <p:spPr>
+          <a:xfrm>
+            <a:off x="838199" y="887730"/>
+            <a:ext cx="10515600" cy="386080"/>
+          </a:xfrm>
+        </p:spPr>
+        <p:txBody>
+          <a:bodyPr>
+            <a:normAutofit/>
+          </a:bodyPr>
+          <a:lstStyle>
+            <a:lvl1pPr marL="0" indent="0">
+              <a:buNone/>
+              <a:defRPr sz="1800"/>
+            </a:lvl1pPr>
+          </a:lstStyle>
+          <a:p>
+            <a:pPr lvl="0"/>
+            <a:r>
+              <a:rPr lang="en-GB" dirty="0"/>
+              <a:t>Click to edit Master text styles</a:t>
+            </a:r>
+          </a:p>
+        </p:txBody>
+      </p:sp>
+      <p:sp>
+        <p:nvSpPr>
+          <p:cNvPr id="9" name="Table Placeholder 8">
+            <a:extLst>
+              <a:ext uri="{FF2B5EF4-FFF2-40B4-BE49-F238E27FC236}">
+                <a16:creationId xmlns:a16="http://schemas.microsoft.com/office/drawing/2014/main" id="{924EFB97-5ED9-E5B5-9581-BD88B1FFFA77}"/>
+              </a:ext>
+            </a:extLst>
+          </p:cNvPr>
+          <p:cNvSpPr>
+            <a:spLocks noGrp="1"/>
+          </p:cNvSpPr>
+          <p:nvPr>
+            <p:ph type="tbl" sz="quarter" idx="17"/>
+          </p:nvPr>
+        </p:nvSpPr>
+        <p:spPr>
+          <a:xfrm>
+            <a:off x="6237171" y="1432560"/>
+            <a:ext cx="5116628" cy="4277360"/>
+          </a:xfrm>
+        </p:spPr>
+        <p:txBody>
+          <a:bodyPr>
+            <a:normAutofit/>
+          </a:bodyPr>
+          <a:lstStyle>
+            <a:lvl1pPr marL="0" indent="0">
+              <a:buNone/>
+              <a:defRPr sz="1400"/>
+            </a:lvl1pPr>
+          </a:lstStyle>
+          <a:p>
+            <a:endParaRPr lang="en-GB" dirty="0"/>
+          </a:p>
+        </p:txBody>
+      </p:sp>
+    </p:spTree>
+    <p:extLst>
+      <p:ext uri="{BB962C8B-B14F-4D97-AF65-F5344CB8AC3E}">
+        <p14:creationId xmlns:p14="http://schemas.microsoft.com/office/powerpoint/2010/main" val="3239318632"/>
       </p:ext>
     </p:extLst>
   </p:cSld>
@@ -269,10 +631,9 @@
           <a:lstStyle/>
           <a:p>
             <a:r>
-              <a:rPr lang="en-US"/>
+              <a:rPr lang="en-US" dirty="0"/>
               <a:t>Click to edit Master title style</a:t>
             </a:r>
-            <a:endParaRPr lang="en-US" dirty="0"/>
           </a:p>
         </p:txBody>
       </p:sp>
@@ -303,38 +664,37 @@
           <a:p>
             <a:pPr lvl="0"/>
             <a:r>
-              <a:rPr lang="en-US"/>
+              <a:rPr lang="en-US" dirty="0"/>
               <a:t>Edit Master text styles</a:t>
             </a:r>
           </a:p>
           <a:p>
             <a:pPr lvl="1"/>
             <a:r>
-              <a:rPr lang="en-US"/>
+              <a:rPr lang="en-US" dirty="0"/>
               <a:t>Second level</a:t>
             </a:r>
           </a:p>
           <a:p>
             <a:pPr lvl="2"/>
             <a:r>
-              <a:rPr lang="en-US"/>
+              <a:rPr lang="en-US" dirty="0"/>
               <a:t>Third level</a:t>
             </a:r>
           </a:p>
           <a:p>
             <a:pPr lvl="3"/>
             <a:r>
-              <a:rPr lang="en-US"/>
+              <a:rPr lang="en-US" dirty="0"/>
               <a:t>Fourth level</a:t>
             </a:r>
           </a:p>
           <a:p>
             <a:pPr lvl="4"/>
             <a:r>
-              <a:rPr lang="en-US"/>
+              <a:rPr lang="en-US" dirty="0"/>
               <a:t>Fifth level</a:t>
             </a:r>
-            <a:endParaRPr lang="en-US" dirty="0"/>
           </a:p>
         </p:txBody>
       </p:sp>
@@ -373,7 +733,7 @@
           <a:p>
             <a:fld id="{98624D31-43A5-475A-80CF-332C9F6DCF35}" type="datetimeFigureOut">
               <a:rPr lang="en-US" smtClean="0"/>
-              <a:t>5/13/21</a:t>
+              <a:t>5/18/23</a:t>
             </a:fld>
             <a:endParaRPr lang="en-US" dirty="0"/>
           </a:p>
@@ -460,10 +820,10 @@
       </p:sp>
       <p:pic>
         <p:nvPicPr>
-          <p:cNvPr id="8" name="Picture 7" descr="A picture containing logo&#10;&#10;Description automatically generated">
+          <p:cNvPr id="8" name="Picture 7" descr="A picture containing graphics, graphic design, font, screenshot&#10;&#10;Description automatically generated">
             <a:extLst>
               <a:ext uri="{FF2B5EF4-FFF2-40B4-BE49-F238E27FC236}">
-                <a16:creationId xmlns:a16="http://schemas.microsoft.com/office/drawing/2014/main" id="{A7B3F9E6-8EA2-DD4D-B42A-17E5540CD5E8}"/>
+                <a16:creationId xmlns:a16="http://schemas.microsoft.com/office/drawing/2014/main" id="{68A445E6-E2E8-11D3-B159-07308A348BA0}"/>
               </a:ext>
             </a:extLst>
           </p:cNvPr>
@@ -473,15 +833,15 @@
           <p:nvPr userDrawn="1"/>
         </p:nvPicPr>
         <p:blipFill>
-          <a:blip r:embed="rId3"/>
+          <a:blip r:embed="rId4"/>
           <a:stretch>
             <a:fillRect/>
           </a:stretch>
         </p:blipFill>
         <p:spPr>
           <a:xfrm>
-            <a:off x="9234170" y="365125"/>
-            <a:ext cx="2119630" cy="284196"/>
+            <a:off x="8617974" y="321176"/>
+            <a:ext cx="2735826" cy="496971"/>
           </a:xfrm>
           <a:prstGeom prst="rect">
             <a:avLst/>
@@ -498,6 +858,7 @@
   <p:clrMap bg1="lt1" tx1="dk1" bg2="lt2" tx2="dk2" accent1="accent1" accent2="accent2" accent3="accent3" accent4="accent4" accent5="accent5" accent6="accent6" hlink="hlink" folHlink="folHlink"/>
   <p:sldLayoutIdLst>
     <p:sldLayoutId id="2147483871" r:id="rId1"/>
+    <p:sldLayoutId id="2147483872" r:id="rId2"/>
   </p:sldLayoutIdLst>
   <p:hf sldNum="0" hdr="0" ftr="0" dt="0"/>
   <p:txStyles>

</xml_diff>